<commit_message>
Git presentaion is changed
Git presentaion is changed
</commit_message>
<xml_diff>
--- a/Presentations/Work with GitHub/Git.pptx
+++ b/Presentations/Work with GitHub/Git.pptx
@@ -134,7 +134,7 @@
   </p:defaultTextStyle>
   <p:extLst>
     <p:ext uri="{EFAFB233-063F-42B5-8137-9DF3F51BA10A}">
-      <p15:sldGuideLst xmlns:p15="http://schemas.microsoft.com/office/powerpoint/2012/main" xmlns="">
+      <p15:sldGuideLst xmlns="" xmlns:p15="http://schemas.microsoft.com/office/powerpoint/2012/main">
         <p15:guide id="1" orient="horz" pos="708">
           <p15:clr>
             <a:srgbClr val="A4A3A4"/>
@@ -263,7 +263,7 @@
       </p15:sldGuideLst>
     </p:ext>
     <p:ext uri="{2D200454-40CA-4A62-9FC3-DE9A4176ACB9}">
-      <p15:notesGuideLst xmlns:p15="http://schemas.microsoft.com/office/powerpoint/2012/main" xmlns="">
+      <p15:notesGuideLst xmlns="" xmlns:p15="http://schemas.microsoft.com/office/powerpoint/2012/main">
         <p15:guide id="1" orient="horz" pos="5938">
           <p15:clr>
             <a:srgbClr val="A4A3A4"/>
@@ -28957,22 +28957,60 @@
           </a:p>
           <a:p>
             <a:r>
+              <a:rPr lang="de-DE" dirty="0" smtClean="0"/>
+              <a:t>Create </a:t>
+            </a:r>
+            <a:r>
               <a:rPr lang="de-DE" dirty="0" err="1" smtClean="0"/>
               <a:t>GitHub</a:t>
             </a:r>
             <a:r>
               <a:rPr lang="de-DE" dirty="0" smtClean="0"/>
+              <a:t> Account and </a:t>
+            </a:r>
+            <a:r>
+              <a:rPr lang="de-DE" dirty="0" err="1" smtClean="0"/>
+              <a:t>Install</a:t>
+            </a:r>
+            <a:r>
+              <a:rPr lang="de-DE" dirty="0" smtClean="0"/>
               <a:t> </a:t>
             </a:r>
             <a:r>
               <a:rPr lang="de-DE" dirty="0" err="1" smtClean="0"/>
+              <a:t>GitHub</a:t>
+            </a:r>
+            <a:r>
+              <a:rPr lang="de-DE" dirty="0" smtClean="0"/>
+              <a:t> </a:t>
+            </a:r>
+            <a:r>
+              <a:rPr lang="de-DE" dirty="0" err="1" smtClean="0"/>
               <a:t>for</a:t>
             </a:r>
             <a:r>
-              <a:rPr lang="de-DE" smtClean="0"/>
+              <a:rPr lang="de-DE" dirty="0" smtClean="0"/>
               <a:t> Windows</a:t>
             </a:r>
             <a:endParaRPr lang="de-DE" dirty="0" smtClean="0"/>
+          </a:p>
+          <a:p>
+            <a:r>
+              <a:rPr lang="de-DE" dirty="0" err="1" smtClean="0"/>
+              <a:t>GitHub</a:t>
+            </a:r>
+            <a:r>
+              <a:rPr lang="de-DE" dirty="0" smtClean="0"/>
+              <a:t> </a:t>
+            </a:r>
+            <a:r>
+              <a:rPr lang="de-DE" dirty="0" err="1" smtClean="0"/>
+              <a:t>for</a:t>
+            </a:r>
+            <a:r>
+              <a:rPr lang="de-DE" dirty="0" smtClean="0"/>
+              <a:t> Windows</a:t>
+            </a:r>
           </a:p>
           <a:p>
             <a:endParaRPr lang="de-DE" dirty="0" smtClean="0"/>
@@ -32960,6 +32998,75 @@
 </file>
 
 <file path=customXml/item1.xml><?xml version="1.0" encoding="utf-8"?>
+<?mso-contentType ?>
+<FormTemplates xmlns="http://schemas.microsoft.com/sharepoint/v3/contenttype/forms">
+  <Display>DocumentLibraryForm</Display>
+  <Edit>DocumentLibraryForm</Edit>
+  <New>DocumentLibraryForm</New>
+</FormTemplates>
+</file>
+
+<file path=customXml/item2.xml><?xml version="1.0" encoding="utf-8"?>
+<p:properties xmlns:p="http://schemas.microsoft.com/office/2006/metadata/properties" xmlns:xsi="http://www.w3.org/2001/XMLSchema-instance" xmlns:pc="http://schemas.microsoft.com/office/infopath/2007/PartnerControls">
+  <documentManagement>
+    <p986eefbff5f4b2788134fa6982c2730 xmlns="fdaf2857-34a0-4271-9efd-53feeda81814">
+      <Terms xmlns="http://schemas.microsoft.com/office/infopath/2007/PartnerControls">
+        <TermInfo xmlns="http://schemas.microsoft.com/office/infopath/2007/PartnerControls">
+          <TermName xmlns="http://schemas.microsoft.com/office/infopath/2007/PartnerControls">Not applicable</TermName>
+          <TermId xmlns="http://schemas.microsoft.com/office/infopath/2007/PartnerControls">15480a47-f0f1-4795-a643-bf3b2e95805c</TermId>
+        </TermInfo>
+      </Terms>
+    </p986eefbff5f4b2788134fa6982c2730>
+    <TaxCatchAll xmlns="eaa6d935-851e-4683-8fb3-4830ef9470e6">
+      <Value>64</Value>
+      <Value>544</Value>
+      <Value>69</Value>
+      <Value>57</Value>
+    </TaxCatchAll>
+    <m0c14ac2d9c042e3be8883c9fd5ef198 xmlns="fdaf2857-34a0-4271-9efd-53feeda81814">
+      <Terms xmlns="http://schemas.microsoft.com/office/infopath/2007/PartnerControls"/>
+    </m0c14ac2d9c042e3be8883c9fd5ef198>
+    <a9556e1ac9ee423090b285ae20260b00 xmlns="fdaf2857-34a0-4271-9efd-53feeda81814">
+      <Terms xmlns="http://schemas.microsoft.com/office/infopath/2007/PartnerControls"/>
+    </a9556e1ac9ee423090b285ae20260b00>
+    <h059eda5e5c344e5901eabd9b8ae1d5d xmlns="fdaf2857-34a0-4271-9efd-53feeda81814">
+      <Terms xmlns="http://schemas.microsoft.com/office/infopath/2007/PartnerControls">
+        <TermInfo xmlns="http://schemas.microsoft.com/office/infopath/2007/PartnerControls">
+          <TermName xmlns="http://schemas.microsoft.com/office/infopath/2007/PartnerControls">Not applicable</TermName>
+          <TermId xmlns="http://schemas.microsoft.com/office/infopath/2007/PartnerControls">1b0d69d1-6137-41de-9ae5-e5925610d8cb</TermId>
+        </TermInfo>
+      </Terms>
+    </h059eda5e5c344e5901eabd9b8ae1d5d>
+    <e999b8edfbce4772b22c3a8c74ff36ce xmlns="fdaf2857-34a0-4271-9efd-53feeda81814">
+      <Terms xmlns="http://schemas.microsoft.com/office/infopath/2007/PartnerControls"/>
+    </e999b8edfbce4772b22c3a8c74ff36ce>
+    <i6d89d2a22ad4b4885b9858a4f35747a xmlns="fdaf2857-34a0-4271-9efd-53feeda81814">
+      <Terms xmlns="http://schemas.microsoft.com/office/infopath/2007/PartnerControls">
+        <TermInfo xmlns="http://schemas.microsoft.com/office/infopath/2007/PartnerControls">
+          <TermName xmlns="http://schemas.microsoft.com/office/infopath/2007/PartnerControls">Global</TermName>
+          <TermId xmlns="http://schemas.microsoft.com/office/infopath/2007/PartnerControls">3eaca359-c4b3-4b51-a927-e9852da92384</TermId>
+        </TermInfo>
+      </Terms>
+    </i6d89d2a22ad4b4885b9858a4f35747a>
+    <PublishingExpirationDate xmlns="http://schemas.microsoft.com/sharepoint/v3" xsi:nil="true"/>
+    <PublishingStartDate xmlns="http://schemas.microsoft.com/sharepoint/v3" xsi:nil="true"/>
+    <jf0640f97dcd40049d3fc8c3d10ff855 xmlns="fdaf2857-34a0-4271-9efd-53feeda81814">
+      <Terms xmlns="http://schemas.microsoft.com/office/infopath/2007/PartnerControls"/>
+    </jf0640f97dcd40049d3fc8c3d10ff855>
+    <TaxKeywordTaxHTField xmlns="eaa6d935-851e-4683-8fb3-4830ef9470e6">
+      <Terms xmlns="http://schemas.microsoft.com/office/infopath/2007/PartnerControls">
+        <TermInfo xmlns="http://schemas.microsoft.com/office/infopath/2007/PartnerControls">
+          <TermName xmlns="http://schemas.microsoft.com/office/infopath/2007/PartnerControls">Company branding</TermName>
+          <TermId xmlns="http://schemas.microsoft.com/office/infopath/2007/PartnerControls">6fa27269-0b89-4159-8d96-bcb709e5e0c2</TermId>
+        </TermInfo>
+      </Terms>
+    </TaxKeywordTaxHTField>
+    <AverageRating xmlns="http://schemas.microsoft.com/sharepoint/v3" xsi:nil="true"/>
+  </documentManagement>
+</p:properties>
+</file>
+
+<file path=customXml/item3.xml><?xml version="1.0" encoding="utf-8"?>
 <ct:contentTypeSchema xmlns:ct="http://schemas.microsoft.com/office/2006/metadata/contentType" xmlns:ma="http://schemas.microsoft.com/office/2006/metadata/properties/metaAttributes" ct:_="" ma:_="" ma:contentTypeName="Document" ma:contentTypeID="0x010100D9151DFF91B0A44197B29C020F8C642F" ma:contentTypeVersion="44" ma:contentTypeDescription="Create a new document." ma:contentTypeScope="" ma:versionID="37d6c69e0f0b1eab2d91fd3d2fe12a06">
   <xsd:schema xmlns:xsd="http://www.w3.org/2001/XMLSchema" xmlns:xs="http://www.w3.org/2001/XMLSchema" xmlns:p="http://schemas.microsoft.com/office/2006/metadata/properties" xmlns:ns1="http://schemas.microsoft.com/sharepoint/v3" xmlns:ns2="fdaf2857-34a0-4271-9efd-53feeda81814" xmlns:ns3="eaa6d935-851e-4683-8fb3-4830ef9470e6" targetNamespace="http://schemas.microsoft.com/office/2006/metadata/properties" ma:root="true" ma:fieldsID="306287739f13a793c1a58b147bf45c68" ns1:_="" ns2:_="" ns3:_="">
     <xsd:import namespace="http://schemas.microsoft.com/sharepoint/v3"/>
@@ -33201,91 +33308,10 @@
 </ct:contentTypeSchema>
 </file>
 
-<file path=customXml/item2.xml><?xml version="1.0" encoding="utf-8"?>
-<p:properties xmlns:p="http://schemas.microsoft.com/office/2006/metadata/properties" xmlns:xsi="http://www.w3.org/2001/XMLSchema-instance" xmlns:pc="http://schemas.microsoft.com/office/infopath/2007/PartnerControls">
-  <documentManagement>
-    <p986eefbff5f4b2788134fa6982c2730 xmlns="fdaf2857-34a0-4271-9efd-53feeda81814">
-      <Terms xmlns="http://schemas.microsoft.com/office/infopath/2007/PartnerControls">
-        <TermInfo xmlns="http://schemas.microsoft.com/office/infopath/2007/PartnerControls">
-          <TermName xmlns="http://schemas.microsoft.com/office/infopath/2007/PartnerControls">Not applicable</TermName>
-          <TermId xmlns="http://schemas.microsoft.com/office/infopath/2007/PartnerControls">15480a47-f0f1-4795-a643-bf3b2e95805c</TermId>
-        </TermInfo>
-      </Terms>
-    </p986eefbff5f4b2788134fa6982c2730>
-    <TaxCatchAll xmlns="eaa6d935-851e-4683-8fb3-4830ef9470e6">
-      <Value>64</Value>
-      <Value>544</Value>
-      <Value>69</Value>
-      <Value>57</Value>
-    </TaxCatchAll>
-    <m0c14ac2d9c042e3be8883c9fd5ef198 xmlns="fdaf2857-34a0-4271-9efd-53feeda81814">
-      <Terms xmlns="http://schemas.microsoft.com/office/infopath/2007/PartnerControls"/>
-    </m0c14ac2d9c042e3be8883c9fd5ef198>
-    <a9556e1ac9ee423090b285ae20260b00 xmlns="fdaf2857-34a0-4271-9efd-53feeda81814">
-      <Terms xmlns="http://schemas.microsoft.com/office/infopath/2007/PartnerControls"/>
-    </a9556e1ac9ee423090b285ae20260b00>
-    <h059eda5e5c344e5901eabd9b8ae1d5d xmlns="fdaf2857-34a0-4271-9efd-53feeda81814">
-      <Terms xmlns="http://schemas.microsoft.com/office/infopath/2007/PartnerControls">
-        <TermInfo xmlns="http://schemas.microsoft.com/office/infopath/2007/PartnerControls">
-          <TermName xmlns="http://schemas.microsoft.com/office/infopath/2007/PartnerControls">Not applicable</TermName>
-          <TermId xmlns="http://schemas.microsoft.com/office/infopath/2007/PartnerControls">1b0d69d1-6137-41de-9ae5-e5925610d8cb</TermId>
-        </TermInfo>
-      </Terms>
-    </h059eda5e5c344e5901eabd9b8ae1d5d>
-    <e999b8edfbce4772b22c3a8c74ff36ce xmlns="fdaf2857-34a0-4271-9efd-53feeda81814">
-      <Terms xmlns="http://schemas.microsoft.com/office/infopath/2007/PartnerControls"/>
-    </e999b8edfbce4772b22c3a8c74ff36ce>
-    <i6d89d2a22ad4b4885b9858a4f35747a xmlns="fdaf2857-34a0-4271-9efd-53feeda81814">
-      <Terms xmlns="http://schemas.microsoft.com/office/infopath/2007/PartnerControls">
-        <TermInfo xmlns="http://schemas.microsoft.com/office/infopath/2007/PartnerControls">
-          <TermName xmlns="http://schemas.microsoft.com/office/infopath/2007/PartnerControls">Global</TermName>
-          <TermId xmlns="http://schemas.microsoft.com/office/infopath/2007/PartnerControls">3eaca359-c4b3-4b51-a927-e9852da92384</TermId>
-        </TermInfo>
-      </Terms>
-    </i6d89d2a22ad4b4885b9858a4f35747a>
-    <PublishingExpirationDate xmlns="http://schemas.microsoft.com/sharepoint/v3" xsi:nil="true"/>
-    <PublishingStartDate xmlns="http://schemas.microsoft.com/sharepoint/v3" xsi:nil="true"/>
-    <jf0640f97dcd40049d3fc8c3d10ff855 xmlns="fdaf2857-34a0-4271-9efd-53feeda81814">
-      <Terms xmlns="http://schemas.microsoft.com/office/infopath/2007/PartnerControls"/>
-    </jf0640f97dcd40049d3fc8c3d10ff855>
-    <TaxKeywordTaxHTField xmlns="eaa6d935-851e-4683-8fb3-4830ef9470e6">
-      <Terms xmlns="http://schemas.microsoft.com/office/infopath/2007/PartnerControls">
-        <TermInfo xmlns="http://schemas.microsoft.com/office/infopath/2007/PartnerControls">
-          <TermName xmlns="http://schemas.microsoft.com/office/infopath/2007/PartnerControls">Company branding</TermName>
-          <TermId xmlns="http://schemas.microsoft.com/office/infopath/2007/PartnerControls">6fa27269-0b89-4159-8d96-bcb709e5e0c2</TermId>
-        </TermInfo>
-      </Terms>
-    </TaxKeywordTaxHTField>
-    <AverageRating xmlns="http://schemas.microsoft.com/sharepoint/v3" xsi:nil="true"/>
-  </documentManagement>
-</p:properties>
-</file>
-
-<file path=customXml/item3.xml><?xml version="1.0" encoding="utf-8"?>
-<?mso-contentType ?>
-<FormTemplates xmlns="http://schemas.microsoft.com/sharepoint/v3/contenttype/forms">
-  <Display>DocumentLibraryForm</Display>
-  <Edit>DocumentLibraryForm</Edit>
-  <New>DocumentLibraryForm</New>
-</FormTemplates>
-</file>
-
 <file path=customXml/itemProps1.xml><?xml version="1.0" encoding="utf-8"?>
-<ds:datastoreItem xmlns:ds="http://schemas.openxmlformats.org/officeDocument/2006/customXml" ds:itemID="{FA016BF0-8A23-4D0D-B803-10B948364DDB}">
+<ds:datastoreItem xmlns:ds="http://schemas.openxmlformats.org/officeDocument/2006/customXml" ds:itemID="{49A21E10-F639-4EDA-B227-AE5450D78494}">
   <ds:schemaRefs>
-    <ds:schemaRef ds:uri="http://schemas.microsoft.com/office/2006/metadata/contentType"/>
-    <ds:schemaRef ds:uri="http://schemas.microsoft.com/office/2006/metadata/properties/metaAttributes"/>
-    <ds:schemaRef ds:uri="http://www.w3.org/2001/XMLSchema"/>
-    <ds:schemaRef ds:uri="http://schemas.microsoft.com/office/2006/metadata/properties"/>
-    <ds:schemaRef ds:uri="http://schemas.microsoft.com/sharepoint/v3"/>
-    <ds:schemaRef ds:uri="fdaf2857-34a0-4271-9efd-53feeda81814"/>
-    <ds:schemaRef ds:uri="eaa6d935-851e-4683-8fb3-4830ef9470e6"/>
-    <ds:schemaRef ds:uri="http://schemas.microsoft.com/office/2006/documentManagement/types"/>
-    <ds:schemaRef ds:uri="http://schemas.microsoft.com/office/infopath/2007/PartnerControls"/>
-    <ds:schemaRef ds:uri="http://schemas.openxmlformats.org/package/2006/metadata/core-properties"/>
-    <ds:schemaRef ds:uri="http://purl.org/dc/elements/1.1/"/>
-    <ds:schemaRef ds:uri="http://purl.org/dc/terms/"/>
-    <ds:schemaRef ds:uri="http://schemas.microsoft.com/internal/obd"/>
+    <ds:schemaRef ds:uri="http://schemas.microsoft.com/sharepoint/v3/contenttype/forms"/>
   </ds:schemaRefs>
 </ds:datastoreItem>
 </file>
@@ -33309,9 +33335,21 @@
 </file>
 
 <file path=customXml/itemProps3.xml><?xml version="1.0" encoding="utf-8"?>
-<ds:datastoreItem xmlns:ds="http://schemas.openxmlformats.org/officeDocument/2006/customXml" ds:itemID="{49A21E10-F639-4EDA-B227-AE5450D78494}">
+<ds:datastoreItem xmlns:ds="http://schemas.openxmlformats.org/officeDocument/2006/customXml" ds:itemID="{FA016BF0-8A23-4D0D-B803-10B948364DDB}">
   <ds:schemaRefs>
-    <ds:schemaRef ds:uri="http://schemas.microsoft.com/sharepoint/v3/contenttype/forms"/>
+    <ds:schemaRef ds:uri="http://schemas.microsoft.com/office/2006/metadata/contentType"/>
+    <ds:schemaRef ds:uri="http://schemas.microsoft.com/office/2006/metadata/properties/metaAttributes"/>
+    <ds:schemaRef ds:uri="http://www.w3.org/2001/XMLSchema"/>
+    <ds:schemaRef ds:uri="http://schemas.microsoft.com/office/2006/metadata/properties"/>
+    <ds:schemaRef ds:uri="http://schemas.microsoft.com/sharepoint/v3"/>
+    <ds:schemaRef ds:uri="fdaf2857-34a0-4271-9efd-53feeda81814"/>
+    <ds:schemaRef ds:uri="eaa6d935-851e-4683-8fb3-4830ef9470e6"/>
+    <ds:schemaRef ds:uri="http://schemas.microsoft.com/office/2006/documentManagement/types"/>
+    <ds:schemaRef ds:uri="http://schemas.microsoft.com/office/infopath/2007/PartnerControls"/>
+    <ds:schemaRef ds:uri="http://schemas.openxmlformats.org/package/2006/metadata/core-properties"/>
+    <ds:schemaRef ds:uri="http://purl.org/dc/elements/1.1/"/>
+    <ds:schemaRef ds:uri="http://purl.org/dc/terms/"/>
+    <ds:schemaRef ds:uri="http://schemas.microsoft.com/internal/obd"/>
   </ds:schemaRefs>
 </ds:datastoreItem>
 </file>
</xml_diff>